<commit_message>
added initial template functions for cyclegan
</commit_message>
<xml_diff>
--- a/plots.pptx
+++ b/plots.pptx
@@ -6,8 +6,7 @@
   </p:sldMasterIdLst>
   <p:sldIdLst>
     <p:sldId id="256" r:id="rId2"/>
-    <p:sldId id="257" r:id="rId3"/>
-    <p:sldId id="258" r:id="rId4"/>
+    <p:sldId id="258" r:id="rId3"/>
   </p:sldIdLst>
   <p:sldSz cx="12192000" cy="6858000"/>
   <p:notesSz cx="6858000" cy="9144000"/>
@@ -3411,7 +3410,7 @@
           <p:cNvPr id="4" name="Picture 3">
             <a:extLst>
               <a:ext uri="{FF2B5EF4-FFF2-40B4-BE49-F238E27FC236}">
-                <a16:creationId xmlns:a16="http://schemas.microsoft.com/office/drawing/2014/main" id="{0BF755C7-40DF-31D3-8217-E700F9897A22}"/>
+                <a16:creationId xmlns:a16="http://schemas.microsoft.com/office/drawing/2014/main" id="{CAF29328-4FF5-03D5-D268-9A1F122DC88F}"/>
               </a:ext>
             </a:extLst>
           </p:cNvPr>
@@ -3428,50 +3427,20 @@
         </p:blipFill>
         <p:spPr>
           <a:xfrm>
-            <a:off x="553994" y="347663"/>
-            <a:ext cx="7772400" cy="5829300"/>
+            <a:off x="0" y="224464"/>
+            <a:ext cx="6339016" cy="4754262"/>
           </a:xfrm>
           <a:prstGeom prst="rect">
             <a:avLst/>
           </a:prstGeom>
         </p:spPr>
       </p:pic>
-    </p:spTree>
-    <p:extLst>
-      <p:ext uri="{BB962C8B-B14F-4D97-AF65-F5344CB8AC3E}">
-        <p14:creationId xmlns:p14="http://schemas.microsoft.com/office/powerpoint/2010/main" val="1012370901"/>
-      </p:ext>
-    </p:extLst>
-  </p:cSld>
-  <p:clrMapOvr>
-    <a:masterClrMapping/>
-  </p:clrMapOvr>
-</p:sld>
-</file>
-
-<file path=ppt/slides/slide3.xml><?xml version="1.0" encoding="utf-8"?>
-<p:sld xmlns:a="http://schemas.openxmlformats.org/drawingml/2006/main" xmlns:r="http://schemas.openxmlformats.org/officeDocument/2006/relationships" xmlns:p="http://schemas.openxmlformats.org/presentationml/2006/main">
-  <p:cSld>
-    <p:spTree>
-      <p:nvGrpSpPr>
-        <p:cNvPr id="1" name=""/>
-        <p:cNvGrpSpPr/>
-        <p:nvPr/>
-      </p:nvGrpSpPr>
-      <p:grpSpPr>
-        <a:xfrm>
-          <a:off x="0" y="0"/>
-          <a:ext cx="0" cy="0"/>
-          <a:chOff x="0" y="0"/>
-          <a:chExt cx="0" cy="0"/>
-        </a:xfrm>
-      </p:grpSpPr>
       <p:pic>
         <p:nvPicPr>
-          <p:cNvPr id="4" name="Picture 3">
-            <a:extLst>
-              <a:ext uri="{FF2B5EF4-FFF2-40B4-BE49-F238E27FC236}">
-                <a16:creationId xmlns:a16="http://schemas.microsoft.com/office/drawing/2014/main" id="{CAF29328-4FF5-03D5-D268-9A1F122DC88F}"/>
+          <p:cNvPr id="5" name="Picture 4">
+            <a:extLst>
+              <a:ext uri="{FF2B5EF4-FFF2-40B4-BE49-F238E27FC236}">
+                <a16:creationId xmlns:a16="http://schemas.microsoft.com/office/drawing/2014/main" id="{8F49B04E-375A-11C4-BA98-377C8CEC7726}"/>
               </a:ext>
             </a:extLst>
           </p:cNvPr>
@@ -3481,15 +3450,15 @@
           <p:nvPr/>
         </p:nvPicPr>
         <p:blipFill>
-          <a:blip r:embed="rId2"/>
+          <a:blip r:embed="rId3"/>
           <a:stretch>
             <a:fillRect/>
           </a:stretch>
         </p:blipFill>
         <p:spPr>
           <a:xfrm>
-            <a:off x="2209800" y="514350"/>
-            <a:ext cx="7772400" cy="5829300"/>
+            <a:off x="5647038" y="0"/>
+            <a:ext cx="6544962" cy="4908722"/>
           </a:xfrm>
           <a:prstGeom prst="rect">
             <a:avLst/>

</xml_diff>